<commit_message>
add "different level of contribution" slide
</commit_message>
<xml_diff>
--- a/04-pharmaverse/04-Contributing_To_The_Pharmaverse.pptx
+++ b/04-pharmaverse/04-Contributing_To_The_Pharmaverse.pptx
@@ -10,9 +10,10 @@
     <p:sldId id="258" r:id="rId4"/>
     <p:sldId id="259" r:id="rId5"/>
     <p:sldId id="260" r:id="rId6"/>
-    <p:sldId id="261" r:id="rId7"/>
-    <p:sldId id="262" r:id="rId8"/>
-    <p:sldId id="263" r:id="rId9"/>
+    <p:sldId id="264" r:id="rId7"/>
+    <p:sldId id="261" r:id="rId8"/>
+    <p:sldId id="262" r:id="rId9"/>
+    <p:sldId id="263" r:id="rId10"/>
   </p:sldIdLst>
   <p:sldSz cx="12192000" cy="6858000"/>
   <p:notesSz cx="6858000" cy="9144000"/>
@@ -266,7 +267,7 @@
           <a:p>
             <a:fld id="{6B20C4F4-914A-412E-A84A-52823570824D}" type="datetimeFigureOut">
               <a:rPr lang="en-US" smtClean="0"/>
-              <a:t>9/7/2023</a:t>
+              <a:t>9/8/23</a:t>
             </a:fld>
             <a:endParaRPr lang="en-US"/>
           </a:p>
@@ -464,7 +465,7 @@
           <a:p>
             <a:fld id="{6B20C4F4-914A-412E-A84A-52823570824D}" type="datetimeFigureOut">
               <a:rPr lang="en-US" smtClean="0"/>
-              <a:t>9/7/2023</a:t>
+              <a:t>9/8/23</a:t>
             </a:fld>
             <a:endParaRPr lang="en-US"/>
           </a:p>
@@ -672,7 +673,7 @@
           <a:p>
             <a:fld id="{6B20C4F4-914A-412E-A84A-52823570824D}" type="datetimeFigureOut">
               <a:rPr lang="en-US" smtClean="0"/>
-              <a:t>9/7/2023</a:t>
+              <a:t>9/8/23</a:t>
             </a:fld>
             <a:endParaRPr lang="en-US"/>
           </a:p>
@@ -870,7 +871,7 @@
           <a:p>
             <a:fld id="{6B20C4F4-914A-412E-A84A-52823570824D}" type="datetimeFigureOut">
               <a:rPr lang="en-US" smtClean="0"/>
-              <a:t>9/7/2023</a:t>
+              <a:t>9/8/23</a:t>
             </a:fld>
             <a:endParaRPr lang="en-US"/>
           </a:p>
@@ -1145,7 +1146,7 @@
           <a:p>
             <a:fld id="{6B20C4F4-914A-412E-A84A-52823570824D}" type="datetimeFigureOut">
               <a:rPr lang="en-US" smtClean="0"/>
-              <a:t>9/7/2023</a:t>
+              <a:t>9/8/23</a:t>
             </a:fld>
             <a:endParaRPr lang="en-US"/>
           </a:p>
@@ -1410,7 +1411,7 @@
           <a:p>
             <a:fld id="{6B20C4F4-914A-412E-A84A-52823570824D}" type="datetimeFigureOut">
               <a:rPr lang="en-US" smtClean="0"/>
-              <a:t>9/7/2023</a:t>
+              <a:t>9/8/23</a:t>
             </a:fld>
             <a:endParaRPr lang="en-US"/>
           </a:p>
@@ -1822,7 +1823,7 @@
           <a:p>
             <a:fld id="{6B20C4F4-914A-412E-A84A-52823570824D}" type="datetimeFigureOut">
               <a:rPr lang="en-US" smtClean="0"/>
-              <a:t>9/7/2023</a:t>
+              <a:t>9/8/23</a:t>
             </a:fld>
             <a:endParaRPr lang="en-US"/>
           </a:p>
@@ -1963,7 +1964,7 @@
           <a:p>
             <a:fld id="{6B20C4F4-914A-412E-A84A-52823570824D}" type="datetimeFigureOut">
               <a:rPr lang="en-US" smtClean="0"/>
-              <a:t>9/7/2023</a:t>
+              <a:t>9/8/23</a:t>
             </a:fld>
             <a:endParaRPr lang="en-US"/>
           </a:p>
@@ -2076,7 +2077,7 @@
           <a:p>
             <a:fld id="{6B20C4F4-914A-412E-A84A-52823570824D}" type="datetimeFigureOut">
               <a:rPr lang="en-US" smtClean="0"/>
-              <a:t>9/7/2023</a:t>
+              <a:t>9/8/23</a:t>
             </a:fld>
             <a:endParaRPr lang="en-US"/>
           </a:p>
@@ -2387,7 +2388,7 @@
           <a:p>
             <a:fld id="{6B20C4F4-914A-412E-A84A-52823570824D}" type="datetimeFigureOut">
               <a:rPr lang="en-US" smtClean="0"/>
-              <a:t>9/7/2023</a:t>
+              <a:t>9/8/23</a:t>
             </a:fld>
             <a:endParaRPr lang="en-US"/>
           </a:p>
@@ -2675,7 +2676,7 @@
           <a:p>
             <a:fld id="{6B20C4F4-914A-412E-A84A-52823570824D}" type="datetimeFigureOut">
               <a:rPr lang="en-US" smtClean="0"/>
-              <a:t>9/7/2023</a:t>
+              <a:t>9/8/23</a:t>
             </a:fld>
             <a:endParaRPr lang="en-US"/>
           </a:p>
@@ -2916,7 +2917,7 @@
           <a:p>
             <a:fld id="{6B20C4F4-914A-412E-A84A-52823570824D}" type="datetimeFigureOut">
               <a:rPr lang="en-US" smtClean="0"/>
-              <a:t>9/7/2023</a:t>
+              <a:t>9/8/23</a:t>
             </a:fld>
             <a:endParaRPr lang="en-US"/>
           </a:p>
@@ -3799,7 +3800,7 @@
           <p:cNvPr id="2" name="Title 1">
             <a:extLst>
               <a:ext uri="{FF2B5EF4-FFF2-40B4-BE49-F238E27FC236}">
-                <a16:creationId xmlns:a16="http://schemas.microsoft.com/office/drawing/2014/main" id="{E6E92473-15E9-3F94-627D-3E4A63E7A5F0}"/>
+                <a16:creationId xmlns:a16="http://schemas.microsoft.com/office/drawing/2014/main" id="{575F4081-31BC-774C-C1EB-75A050907BFF}"/>
               </a:ext>
             </a:extLst>
           </p:cNvPr>
@@ -3816,8 +3817,8 @@
           <a:lstStyle/>
           <a:p>
             <a:r>
-              <a:rPr lang="en-US" dirty="0"/>
-              <a:t>How to contribute</a:t>
+              <a:rPr lang="en-CH" dirty="0"/>
+              <a:t>Different contribution levels</a:t>
             </a:r>
           </a:p>
         </p:txBody>
@@ -3827,7 +3828,7 @@
           <p:cNvPr id="3" name="Content Placeholder 2">
             <a:extLst>
               <a:ext uri="{FF2B5EF4-FFF2-40B4-BE49-F238E27FC236}">
-                <a16:creationId xmlns:a16="http://schemas.microsoft.com/office/drawing/2014/main" id="{8CD8979D-6E0A-FFBE-FB0E-DDF3EBA095A9}"/>
+                <a16:creationId xmlns:a16="http://schemas.microsoft.com/office/drawing/2014/main" id="{88B5BC8D-FD02-5098-F6E0-E650FCC6A74A}"/>
               </a:ext>
             </a:extLst>
           </p:cNvPr>
@@ -3840,44 +3841,61 @@
         </p:nvSpPr>
         <p:spPr/>
         <p:txBody>
-          <a:bodyPr/>
-          <a:lstStyle/>
-          <a:p>
-            <a:r>
-              <a:rPr lang="en-US" dirty="0"/>
-              <a:t>Use it</a:t>
-            </a:r>
-          </a:p>
-          <a:p>
-            <a:r>
-              <a:rPr lang="en-US" dirty="0"/>
-              <a:t>Open issues when bugs are found</a:t>
-            </a:r>
-          </a:p>
-          <a:p>
-            <a:r>
-              <a:rPr lang="en-US" dirty="0"/>
-              <a:t>Provide feedback on ways to improve</a:t>
-            </a:r>
-          </a:p>
-          <a:p>
-            <a:r>
-              <a:rPr lang="en-US" dirty="0"/>
-              <a:t>Serve as part of the teams developing</a:t>
-            </a:r>
-          </a:p>
-          <a:p>
-            <a:r>
-              <a:rPr lang="en-US" dirty="0"/>
-              <a:t>Contribute code</a:t>
-            </a:r>
+          <a:bodyPr>
+            <a:normAutofit lnSpcReduction="10000"/>
+          </a:bodyPr>
+          <a:lstStyle/>
+          <a:p>
+            <a:r>
+              <a:rPr lang="en-CH" dirty="0"/>
+              <a:t>Submit the issue (bug / docs / feature request)</a:t>
+            </a:r>
+          </a:p>
+          <a:p>
+            <a:r>
+              <a:rPr lang="en-CH" dirty="0"/>
+              <a:t>Submit the issue and (co)develop the PR</a:t>
+            </a:r>
+          </a:p>
+          <a:p>
+            <a:r>
+              <a:rPr lang="en-CH" dirty="0"/>
+              <a:t>Give us the feedback</a:t>
+            </a:r>
+          </a:p>
+          <a:p>
+            <a:r>
+              <a:rPr lang="en-CH" dirty="0"/>
+              <a:t>Wanted to join as a long term contributor – get in touch with the maintainer</a:t>
+            </a:r>
+          </a:p>
+          <a:p>
+            <a:endParaRPr lang="en-CH" dirty="0"/>
+          </a:p>
+          <a:p>
+            <a:endParaRPr lang="en-CH" dirty="0"/>
+          </a:p>
+          <a:p>
+            <a:endParaRPr lang="en-CH" dirty="0"/>
+          </a:p>
+          <a:p>
+            <a:pPr marL="0" indent="0">
+              <a:buNone/>
+            </a:pPr>
+            <a:r>
+              <a:rPr lang="en-CH" dirty="0"/>
+              <a:t>All types of contributions are welcome!</a:t>
+            </a:r>
+          </a:p>
+          <a:p>
+            <a:endParaRPr lang="en-CH" dirty="0"/>
           </a:p>
         </p:txBody>
       </p:sp>
     </p:spTree>
     <p:extLst>
       <p:ext uri="{BB962C8B-B14F-4D97-AF65-F5344CB8AC3E}">
-        <p14:creationId xmlns:p14="http://schemas.microsoft.com/office/powerpoint/2010/main" val="2635565262"/>
+        <p14:creationId xmlns:p14="http://schemas.microsoft.com/office/powerpoint/2010/main" val="3342367078"/>
       </p:ext>
     </p:extLst>
   </p:cSld>
@@ -3909,6 +3927,116 @@
           <p:cNvPr id="2" name="Title 1">
             <a:extLst>
               <a:ext uri="{FF2B5EF4-FFF2-40B4-BE49-F238E27FC236}">
+                <a16:creationId xmlns:a16="http://schemas.microsoft.com/office/drawing/2014/main" id="{E6E92473-15E9-3F94-627D-3E4A63E7A5F0}"/>
+              </a:ext>
+            </a:extLst>
+          </p:cNvPr>
+          <p:cNvSpPr>
+            <a:spLocks noGrp="1"/>
+          </p:cNvSpPr>
+          <p:nvPr>
+            <p:ph type="title"/>
+          </p:nvPr>
+        </p:nvSpPr>
+        <p:spPr/>
+        <p:txBody>
+          <a:bodyPr/>
+          <a:lstStyle/>
+          <a:p>
+            <a:r>
+              <a:rPr lang="en-US" dirty="0"/>
+              <a:t>How to contribute?</a:t>
+            </a:r>
+          </a:p>
+        </p:txBody>
+      </p:sp>
+      <p:sp>
+        <p:nvSpPr>
+          <p:cNvPr id="3" name="Content Placeholder 2">
+            <a:extLst>
+              <a:ext uri="{FF2B5EF4-FFF2-40B4-BE49-F238E27FC236}">
+                <a16:creationId xmlns:a16="http://schemas.microsoft.com/office/drawing/2014/main" id="{8CD8979D-6E0A-FFBE-FB0E-DDF3EBA095A9}"/>
+              </a:ext>
+            </a:extLst>
+          </p:cNvPr>
+          <p:cNvSpPr>
+            <a:spLocks noGrp="1"/>
+          </p:cNvSpPr>
+          <p:nvPr>
+            <p:ph idx="1"/>
+          </p:nvPr>
+        </p:nvSpPr>
+        <p:spPr/>
+        <p:txBody>
+          <a:bodyPr/>
+          <a:lstStyle/>
+          <a:p>
+            <a:r>
+              <a:rPr lang="en-US" dirty="0"/>
+              <a:t>Use it</a:t>
+            </a:r>
+          </a:p>
+          <a:p>
+            <a:r>
+              <a:rPr lang="en-US" dirty="0"/>
+              <a:t>Open issues when bugs are found</a:t>
+            </a:r>
+          </a:p>
+          <a:p>
+            <a:r>
+              <a:rPr lang="en-US" dirty="0"/>
+              <a:t>Provide feedback on ways to improve</a:t>
+            </a:r>
+          </a:p>
+          <a:p>
+            <a:r>
+              <a:rPr lang="en-US" dirty="0"/>
+              <a:t>Serve as part of the teams developing</a:t>
+            </a:r>
+          </a:p>
+          <a:p>
+            <a:r>
+              <a:rPr lang="en-US" dirty="0"/>
+              <a:t>Contribute code</a:t>
+            </a:r>
+          </a:p>
+        </p:txBody>
+      </p:sp>
+    </p:spTree>
+    <p:extLst>
+      <p:ext uri="{BB962C8B-B14F-4D97-AF65-F5344CB8AC3E}">
+        <p14:creationId xmlns:p14="http://schemas.microsoft.com/office/powerpoint/2010/main" val="2635565262"/>
+      </p:ext>
+    </p:extLst>
+  </p:cSld>
+  <p:clrMapOvr>
+    <a:masterClrMapping/>
+  </p:clrMapOvr>
+</p:sld>
+</file>
+
+<file path=ppt/slides/slide8.xml><?xml version="1.0" encoding="utf-8"?>
+<p:sld xmlns:a="http://schemas.openxmlformats.org/drawingml/2006/main" xmlns:r="http://schemas.openxmlformats.org/officeDocument/2006/relationships" xmlns:p="http://schemas.openxmlformats.org/presentationml/2006/main">
+  <p:cSld>
+    <p:spTree>
+      <p:nvGrpSpPr>
+        <p:cNvPr id="1" name=""/>
+        <p:cNvGrpSpPr/>
+        <p:nvPr/>
+      </p:nvGrpSpPr>
+      <p:grpSpPr>
+        <a:xfrm>
+          <a:off x="0" y="0"/>
+          <a:ext cx="0" cy="0"/>
+          <a:chOff x="0" y="0"/>
+          <a:chExt cx="0" cy="0"/>
+        </a:xfrm>
+      </p:grpSpPr>
+      <p:sp>
+        <p:nvSpPr>
+          <p:cNvPr id="2" name="Title 1">
+            <a:extLst>
+              <a:ext uri="{FF2B5EF4-FFF2-40B4-BE49-F238E27FC236}">
                 <a16:creationId xmlns:a16="http://schemas.microsoft.com/office/drawing/2014/main" id="{51DBAFEB-6319-A397-EA82-D82E2A7C6B55}"/>
               </a:ext>
             </a:extLst>
@@ -3979,7 +4107,7 @@
 </p:sld>
 </file>
 
-<file path=ppt/slides/slide8.xml><?xml version="1.0" encoding="utf-8"?>
+<file path=ppt/slides/slide9.xml><?xml version="1.0" encoding="utf-8"?>
 <p:sld xmlns:a="http://schemas.openxmlformats.org/drawingml/2006/main" xmlns:r="http://schemas.openxmlformats.org/officeDocument/2006/relationships" xmlns:p="http://schemas.openxmlformats.org/presentationml/2006/main">
   <p:cSld>
     <p:spTree>

</xml_diff>

<commit_message>
Add more details on contributing and giving feedback
</commit_message>
<xml_diff>
--- a/04-pharmaverse/04-Contributing_To_The_Pharmaverse.pptx
+++ b/04-pharmaverse/04-Contributing_To_The_Pharmaverse.pptx
@@ -10,10 +10,15 @@
     <p:sldId id="258" r:id="rId4"/>
     <p:sldId id="259" r:id="rId5"/>
     <p:sldId id="260" r:id="rId6"/>
-    <p:sldId id="264" r:id="rId7"/>
-    <p:sldId id="261" r:id="rId8"/>
+    <p:sldId id="269" r:id="rId7"/>
+    <p:sldId id="270" r:id="rId8"/>
     <p:sldId id="262" r:id="rId9"/>
-    <p:sldId id="263" r:id="rId10"/>
+    <p:sldId id="265" r:id="rId10"/>
+    <p:sldId id="266" r:id="rId11"/>
+    <p:sldId id="271" r:id="rId12"/>
+    <p:sldId id="263" r:id="rId13"/>
+    <p:sldId id="267" r:id="rId14"/>
+    <p:sldId id="268" r:id="rId15"/>
   </p:sldIdLst>
   <p:sldSz cx="12192000" cy="6858000"/>
   <p:notesSz cx="6858000" cy="9144000"/>
@@ -267,7 +272,7 @@
           <a:p>
             <a:fld id="{6B20C4F4-914A-412E-A84A-52823570824D}" type="datetimeFigureOut">
               <a:rPr lang="en-US" smtClean="0"/>
-              <a:t>9/8/23</a:t>
+              <a:t>9/13/2023</a:t>
             </a:fld>
             <a:endParaRPr lang="en-US"/>
           </a:p>
@@ -465,7 +470,7 @@
           <a:p>
             <a:fld id="{6B20C4F4-914A-412E-A84A-52823570824D}" type="datetimeFigureOut">
               <a:rPr lang="en-US" smtClean="0"/>
-              <a:t>9/8/23</a:t>
+              <a:t>9/13/2023</a:t>
             </a:fld>
             <a:endParaRPr lang="en-US"/>
           </a:p>
@@ -673,7 +678,7 @@
           <a:p>
             <a:fld id="{6B20C4F4-914A-412E-A84A-52823570824D}" type="datetimeFigureOut">
               <a:rPr lang="en-US" smtClean="0"/>
-              <a:t>9/8/23</a:t>
+              <a:t>9/13/2023</a:t>
             </a:fld>
             <a:endParaRPr lang="en-US"/>
           </a:p>
@@ -871,7 +876,7 @@
           <a:p>
             <a:fld id="{6B20C4F4-914A-412E-A84A-52823570824D}" type="datetimeFigureOut">
               <a:rPr lang="en-US" smtClean="0"/>
-              <a:t>9/8/23</a:t>
+              <a:t>9/13/2023</a:t>
             </a:fld>
             <a:endParaRPr lang="en-US"/>
           </a:p>
@@ -1146,7 +1151,7 @@
           <a:p>
             <a:fld id="{6B20C4F4-914A-412E-A84A-52823570824D}" type="datetimeFigureOut">
               <a:rPr lang="en-US" smtClean="0"/>
-              <a:t>9/8/23</a:t>
+              <a:t>9/13/2023</a:t>
             </a:fld>
             <a:endParaRPr lang="en-US"/>
           </a:p>
@@ -1411,7 +1416,7 @@
           <a:p>
             <a:fld id="{6B20C4F4-914A-412E-A84A-52823570824D}" type="datetimeFigureOut">
               <a:rPr lang="en-US" smtClean="0"/>
-              <a:t>9/8/23</a:t>
+              <a:t>9/13/2023</a:t>
             </a:fld>
             <a:endParaRPr lang="en-US"/>
           </a:p>
@@ -1823,7 +1828,7 @@
           <a:p>
             <a:fld id="{6B20C4F4-914A-412E-A84A-52823570824D}" type="datetimeFigureOut">
               <a:rPr lang="en-US" smtClean="0"/>
-              <a:t>9/8/23</a:t>
+              <a:t>9/13/2023</a:t>
             </a:fld>
             <a:endParaRPr lang="en-US"/>
           </a:p>
@@ -1964,7 +1969,7 @@
           <a:p>
             <a:fld id="{6B20C4F4-914A-412E-A84A-52823570824D}" type="datetimeFigureOut">
               <a:rPr lang="en-US" smtClean="0"/>
-              <a:t>9/8/23</a:t>
+              <a:t>9/13/2023</a:t>
             </a:fld>
             <a:endParaRPr lang="en-US"/>
           </a:p>
@@ -2077,7 +2082,7 @@
           <a:p>
             <a:fld id="{6B20C4F4-914A-412E-A84A-52823570824D}" type="datetimeFigureOut">
               <a:rPr lang="en-US" smtClean="0"/>
-              <a:t>9/8/23</a:t>
+              <a:t>9/13/2023</a:t>
             </a:fld>
             <a:endParaRPr lang="en-US"/>
           </a:p>
@@ -2388,7 +2393,7 @@
           <a:p>
             <a:fld id="{6B20C4F4-914A-412E-A84A-52823570824D}" type="datetimeFigureOut">
               <a:rPr lang="en-US" smtClean="0"/>
-              <a:t>9/8/23</a:t>
+              <a:t>9/13/2023</a:t>
             </a:fld>
             <a:endParaRPr lang="en-US"/>
           </a:p>
@@ -2676,7 +2681,7 @@
           <a:p>
             <a:fld id="{6B20C4F4-914A-412E-A84A-52823570824D}" type="datetimeFigureOut">
               <a:rPr lang="en-US" smtClean="0"/>
-              <a:t>9/8/23</a:t>
+              <a:t>9/13/2023</a:t>
             </a:fld>
             <a:endParaRPr lang="en-US"/>
           </a:p>
@@ -2917,7 +2922,7 @@
           <a:p>
             <a:fld id="{6B20C4F4-914A-412E-A84A-52823570824D}" type="datetimeFigureOut">
               <a:rPr lang="en-US" smtClean="0"/>
-              <a:t>9/8/23</a:t>
+              <a:t>9/13/2023</a:t>
             </a:fld>
             <a:endParaRPr lang="en-US"/>
           </a:p>
@@ -3408,6 +3413,1023 @@
 </p:sld>
 </file>
 
+<file path=ppt/slides/slide10.xml><?xml version="1.0" encoding="utf-8"?>
+<p:sld xmlns:a="http://schemas.openxmlformats.org/drawingml/2006/main" xmlns:r="http://schemas.openxmlformats.org/officeDocument/2006/relationships" xmlns:p="http://schemas.openxmlformats.org/presentationml/2006/main">
+  <p:cSld>
+    <p:spTree>
+      <p:nvGrpSpPr>
+        <p:cNvPr id="1" name=""/>
+        <p:cNvGrpSpPr/>
+        <p:nvPr/>
+      </p:nvGrpSpPr>
+      <p:grpSpPr>
+        <a:xfrm>
+          <a:off x="0" y="0"/>
+          <a:ext cx="0" cy="0"/>
+          <a:chOff x="0" y="0"/>
+          <a:chExt cx="0" cy="0"/>
+        </a:xfrm>
+      </p:grpSpPr>
+      <p:sp>
+        <p:nvSpPr>
+          <p:cNvPr id="2" name="Title 1">
+            <a:extLst>
+              <a:ext uri="{FF2B5EF4-FFF2-40B4-BE49-F238E27FC236}">
+                <a16:creationId xmlns:a16="http://schemas.microsoft.com/office/drawing/2014/main" id="{19213C66-1286-66B5-81E5-991CD41106E6}"/>
+              </a:ext>
+            </a:extLst>
+          </p:cNvPr>
+          <p:cNvSpPr>
+            <a:spLocks noGrp="1"/>
+          </p:cNvSpPr>
+          <p:nvPr>
+            <p:ph type="title"/>
+          </p:nvPr>
+        </p:nvSpPr>
+        <p:spPr/>
+        <p:txBody>
+          <a:bodyPr/>
+          <a:lstStyle/>
+          <a:p>
+            <a:r>
+              <a:rPr lang="en-US" dirty="0"/>
+              <a:t>Opening an Issue (Advanced mode)</a:t>
+            </a:r>
+          </a:p>
+        </p:txBody>
+      </p:sp>
+      <p:sp>
+        <p:nvSpPr>
+          <p:cNvPr id="3" name="Content Placeholder 2">
+            <a:extLst>
+              <a:ext uri="{FF2B5EF4-FFF2-40B4-BE49-F238E27FC236}">
+                <a16:creationId xmlns:a16="http://schemas.microsoft.com/office/drawing/2014/main" id="{48E16900-D0F4-27A6-5BBB-4673F1514A3B}"/>
+              </a:ext>
+            </a:extLst>
+          </p:cNvPr>
+          <p:cNvSpPr>
+            <a:spLocks noGrp="1"/>
+          </p:cNvSpPr>
+          <p:nvPr>
+            <p:ph idx="1"/>
+          </p:nvPr>
+        </p:nvSpPr>
+        <p:spPr/>
+        <p:txBody>
+          <a:bodyPr/>
+          <a:lstStyle/>
+          <a:p>
+            <a:r>
+              <a:rPr lang="en-US" dirty="0"/>
+              <a:t>If you saw an bug today, open an issue with an MVP!</a:t>
+            </a:r>
+          </a:p>
+          <a:p>
+            <a:pPr lvl="1"/>
+            <a:r>
+              <a:rPr lang="en-US" dirty="0"/>
+              <a:t>Find the </a:t>
+            </a:r>
+            <a:r>
+              <a:rPr lang="en-US" dirty="0" err="1"/>
+              <a:t>github</a:t>
+            </a:r>
+            <a:r>
+              <a:rPr lang="en-US" dirty="0"/>
+              <a:t> page for the package</a:t>
+            </a:r>
+          </a:p>
+          <a:p>
+            <a:pPr lvl="1"/>
+            <a:r>
+              <a:rPr lang="en-US" dirty="0"/>
+              <a:t>Click on “Issues” then “New issue”</a:t>
+            </a:r>
+          </a:p>
+          <a:p>
+            <a:pPr lvl="1"/>
+            <a:r>
+              <a:rPr lang="en-US" dirty="0"/>
+              <a:t>Construct an MVP</a:t>
+            </a:r>
+          </a:p>
+          <a:p>
+            <a:pPr lvl="2"/>
+            <a:r>
+              <a:rPr lang="en-US" dirty="0"/>
+              <a:t>Make issue you see reproducible (you can repeat the error)</a:t>
+            </a:r>
+          </a:p>
+          <a:p>
+            <a:pPr lvl="2"/>
+            <a:r>
+              <a:rPr lang="en-US" dirty="0"/>
+              <a:t>See if you can simplify the code down to only the required parts</a:t>
+            </a:r>
+          </a:p>
+          <a:p>
+            <a:pPr lvl="2"/>
+            <a:r>
+              <a:rPr lang="en-US" dirty="0"/>
+              <a:t>Run in a fresh R session to confirm</a:t>
+            </a:r>
+          </a:p>
+          <a:p>
+            <a:pPr lvl="1"/>
+            <a:r>
+              <a:rPr lang="en-US" dirty="0"/>
+              <a:t>Use {</a:t>
+            </a:r>
+            <a:r>
+              <a:rPr lang="en-US" dirty="0" err="1"/>
+              <a:t>reprex</a:t>
+            </a:r>
+            <a:r>
+              <a:rPr lang="en-US" dirty="0"/>
+              <a:t>} to generate code content and write in a) the issue the error you see and b) what you would expect</a:t>
+            </a:r>
+          </a:p>
+          <a:p>
+            <a:pPr lvl="2"/>
+            <a:endParaRPr lang="en-US" dirty="0"/>
+          </a:p>
+          <a:p>
+            <a:endParaRPr lang="en-US" dirty="0"/>
+          </a:p>
+        </p:txBody>
+      </p:sp>
+    </p:spTree>
+    <p:extLst>
+      <p:ext uri="{BB962C8B-B14F-4D97-AF65-F5344CB8AC3E}">
+        <p14:creationId xmlns:p14="http://schemas.microsoft.com/office/powerpoint/2010/main" val="2901306822"/>
+      </p:ext>
+    </p:extLst>
+  </p:cSld>
+  <p:clrMapOvr>
+    <a:masterClrMapping/>
+  </p:clrMapOvr>
+</p:sld>
+</file>
+
+<file path=ppt/slides/slide11.xml><?xml version="1.0" encoding="utf-8"?>
+<p:sld xmlns:a="http://schemas.openxmlformats.org/drawingml/2006/main" xmlns:r="http://schemas.openxmlformats.org/officeDocument/2006/relationships" xmlns:p="http://schemas.openxmlformats.org/presentationml/2006/main">
+  <p:cSld>
+    <p:spTree>
+      <p:nvGrpSpPr>
+        <p:cNvPr id="1" name=""/>
+        <p:cNvGrpSpPr/>
+        <p:nvPr/>
+      </p:nvGrpSpPr>
+      <p:grpSpPr>
+        <a:xfrm>
+          <a:off x="0" y="0"/>
+          <a:ext cx="0" cy="0"/>
+          <a:chOff x="0" y="0"/>
+          <a:chExt cx="0" cy="0"/>
+        </a:xfrm>
+      </p:grpSpPr>
+      <p:sp>
+        <p:nvSpPr>
+          <p:cNvPr id="2" name="Title 1">
+            <a:extLst>
+              <a:ext uri="{FF2B5EF4-FFF2-40B4-BE49-F238E27FC236}">
+                <a16:creationId xmlns:a16="http://schemas.microsoft.com/office/drawing/2014/main" id="{575F4081-31BC-774C-C1EB-75A050907BFF}"/>
+              </a:ext>
+            </a:extLst>
+          </p:cNvPr>
+          <p:cNvSpPr>
+            <a:spLocks noGrp="1"/>
+          </p:cNvSpPr>
+          <p:nvPr>
+            <p:ph type="title"/>
+          </p:nvPr>
+        </p:nvSpPr>
+        <p:spPr/>
+        <p:txBody>
+          <a:bodyPr/>
+          <a:lstStyle/>
+          <a:p>
+            <a:r>
+              <a:rPr lang="en-US" dirty="0"/>
+              <a:t>C</a:t>
+            </a:r>
+            <a:r>
+              <a:rPr lang="en-CH" dirty="0"/>
+              <a:t>ontribution levels</a:t>
+            </a:r>
+          </a:p>
+        </p:txBody>
+      </p:sp>
+      <p:sp>
+        <p:nvSpPr>
+          <p:cNvPr id="3" name="Content Placeholder 2">
+            <a:extLst>
+              <a:ext uri="{FF2B5EF4-FFF2-40B4-BE49-F238E27FC236}">
+                <a16:creationId xmlns:a16="http://schemas.microsoft.com/office/drawing/2014/main" id="{88B5BC8D-FD02-5098-F6E0-E650FCC6A74A}"/>
+              </a:ext>
+            </a:extLst>
+          </p:cNvPr>
+          <p:cNvSpPr>
+            <a:spLocks noGrp="1"/>
+          </p:cNvSpPr>
+          <p:nvPr>
+            <p:ph idx="1"/>
+          </p:nvPr>
+        </p:nvSpPr>
+        <p:spPr/>
+        <p:txBody>
+          <a:bodyPr>
+            <a:normAutofit/>
+          </a:bodyPr>
+          <a:lstStyle/>
+          <a:p>
+            <a:r>
+              <a:rPr lang="en-US" dirty="0"/>
+              <a:t>Use the packages</a:t>
+            </a:r>
+          </a:p>
+          <a:p>
+            <a:r>
+              <a:rPr lang="en-CH" dirty="0"/>
+              <a:t>Submit </a:t>
+            </a:r>
+            <a:r>
+              <a:rPr lang="en-US" dirty="0"/>
+              <a:t>I</a:t>
+            </a:r>
+            <a:r>
+              <a:rPr lang="en-CH" dirty="0"/>
+              <a:t>ssue</a:t>
+            </a:r>
+            <a:r>
+              <a:rPr lang="en-US" dirty="0"/>
+              <a:t>s</a:t>
+            </a:r>
+            <a:r>
+              <a:rPr lang="en-CH" dirty="0"/>
+              <a:t> </a:t>
+            </a:r>
+            <a:endParaRPr lang="en-US" dirty="0"/>
+          </a:p>
+          <a:p>
+            <a:pPr lvl="1"/>
+            <a:r>
+              <a:rPr lang="en-CH" dirty="0"/>
+              <a:t>doc</a:t>
+            </a:r>
+            <a:r>
+              <a:rPr lang="en-US" dirty="0" err="1"/>
+              <a:t>umentation</a:t>
+            </a:r>
+            <a:r>
+              <a:rPr lang="en-CH" dirty="0"/>
+              <a:t> </a:t>
+            </a:r>
+            <a:endParaRPr lang="en-US" dirty="0"/>
+          </a:p>
+          <a:p>
+            <a:pPr lvl="1"/>
+            <a:r>
+              <a:rPr lang="en-CH" dirty="0"/>
+              <a:t>feature request</a:t>
+            </a:r>
+            <a:r>
+              <a:rPr lang="en-US" dirty="0"/>
+              <a:t>s</a:t>
+            </a:r>
+          </a:p>
+          <a:p>
+            <a:pPr lvl="1"/>
+            <a:r>
+              <a:rPr lang="en-CH" dirty="0"/>
+              <a:t>bug</a:t>
+            </a:r>
+          </a:p>
+          <a:p>
+            <a:r>
+              <a:rPr lang="en-CH" dirty="0"/>
+              <a:t>Submit </a:t>
+            </a:r>
+            <a:r>
+              <a:rPr lang="en-US" dirty="0"/>
+              <a:t>I</a:t>
+            </a:r>
+            <a:r>
+              <a:rPr lang="en-CH" dirty="0"/>
+              <a:t>ssue</a:t>
+            </a:r>
+            <a:r>
+              <a:rPr lang="en-US" dirty="0"/>
+              <a:t>s</a:t>
+            </a:r>
+            <a:r>
+              <a:rPr lang="en-CH" dirty="0"/>
+              <a:t> and (co)develop the PR</a:t>
+            </a:r>
+          </a:p>
+          <a:p>
+            <a:r>
+              <a:rPr lang="en-US" dirty="0"/>
+              <a:t>J</a:t>
+            </a:r>
+            <a:r>
+              <a:rPr lang="en-CH" dirty="0"/>
+              <a:t>oin as a contributor – get in touch with the maintainer</a:t>
+            </a:r>
+          </a:p>
+          <a:p>
+            <a:pPr marL="0" indent="0">
+              <a:buNone/>
+            </a:pPr>
+            <a:endParaRPr lang="en-CH" dirty="0"/>
+          </a:p>
+          <a:p>
+            <a:pPr marL="0" indent="0">
+              <a:buNone/>
+            </a:pPr>
+            <a:r>
+              <a:rPr lang="en-CH" dirty="0"/>
+              <a:t>All types of contributions are welcome!</a:t>
+            </a:r>
+          </a:p>
+          <a:p>
+            <a:endParaRPr lang="en-CH" dirty="0"/>
+          </a:p>
+        </p:txBody>
+      </p:sp>
+    </p:spTree>
+    <p:extLst>
+      <p:ext uri="{BB962C8B-B14F-4D97-AF65-F5344CB8AC3E}">
+        <p14:creationId xmlns:p14="http://schemas.microsoft.com/office/powerpoint/2010/main" val="3564788154"/>
+      </p:ext>
+    </p:extLst>
+  </p:cSld>
+  <p:clrMapOvr>
+    <a:masterClrMapping/>
+  </p:clrMapOvr>
+  <p:timing>
+    <p:tnLst>
+      <p:par>
+        <p:cTn id="1" dur="indefinite" restart="never" nodeType="tmRoot">
+          <p:childTnLst>
+            <p:seq concurrent="1" nextAc="seek">
+              <p:cTn id="2" dur="indefinite" nodeType="mainSeq">
+                <p:childTnLst>
+                  <p:par>
+                    <p:cTn id="3" fill="hold">
+                      <p:stCondLst>
+                        <p:cond delay="indefinite"/>
+                      </p:stCondLst>
+                      <p:childTnLst>
+                        <p:par>
+                          <p:cTn id="4" fill="hold">
+                            <p:stCondLst>
+                              <p:cond delay="0"/>
+                            </p:stCondLst>
+                            <p:childTnLst>
+                              <p:par>
+                                <p:cTn id="5" presetID="1" presetClass="entr" presetSubtype="0" fill="hold" nodeType="clickEffect">
+                                  <p:stCondLst>
+                                    <p:cond delay="0"/>
+                                  </p:stCondLst>
+                                  <p:childTnLst>
+                                    <p:set>
+                                      <p:cBhvr>
+                                        <p:cTn id="6" dur="1" fill="hold">
+                                          <p:stCondLst>
+                                            <p:cond delay="0"/>
+                                          </p:stCondLst>
+                                        </p:cTn>
+                                        <p:tgtEl>
+                                          <p:spTgt spid="3">
+                                            <p:txEl>
+                                              <p:pRg st="5" end="5"/>
+                                            </p:txEl>
+                                          </p:spTgt>
+                                        </p:tgtEl>
+                                        <p:attrNameLst>
+                                          <p:attrName>style.visibility</p:attrName>
+                                        </p:attrNameLst>
+                                      </p:cBhvr>
+                                      <p:to>
+                                        <p:strVal val="visible"/>
+                                      </p:to>
+                                    </p:set>
+                                  </p:childTnLst>
+                                </p:cTn>
+                              </p:par>
+                            </p:childTnLst>
+                          </p:cTn>
+                        </p:par>
+                      </p:childTnLst>
+                    </p:cTn>
+                  </p:par>
+                  <p:par>
+                    <p:cTn id="7" fill="hold">
+                      <p:stCondLst>
+                        <p:cond delay="indefinite"/>
+                      </p:stCondLst>
+                      <p:childTnLst>
+                        <p:par>
+                          <p:cTn id="8" fill="hold">
+                            <p:stCondLst>
+                              <p:cond delay="0"/>
+                            </p:stCondLst>
+                            <p:childTnLst>
+                              <p:par>
+                                <p:cTn id="9" presetID="1" presetClass="entr" presetSubtype="0" fill="hold" nodeType="clickEffect">
+                                  <p:stCondLst>
+                                    <p:cond delay="0"/>
+                                  </p:stCondLst>
+                                  <p:childTnLst>
+                                    <p:set>
+                                      <p:cBhvr>
+                                        <p:cTn id="10" dur="1" fill="hold">
+                                          <p:stCondLst>
+                                            <p:cond delay="0"/>
+                                          </p:stCondLst>
+                                        </p:cTn>
+                                        <p:tgtEl>
+                                          <p:spTgt spid="3">
+                                            <p:txEl>
+                                              <p:pRg st="6" end="6"/>
+                                            </p:txEl>
+                                          </p:spTgt>
+                                        </p:tgtEl>
+                                        <p:attrNameLst>
+                                          <p:attrName>style.visibility</p:attrName>
+                                        </p:attrNameLst>
+                                      </p:cBhvr>
+                                      <p:to>
+                                        <p:strVal val="visible"/>
+                                      </p:to>
+                                    </p:set>
+                                  </p:childTnLst>
+                                </p:cTn>
+                              </p:par>
+                            </p:childTnLst>
+                          </p:cTn>
+                        </p:par>
+                      </p:childTnLst>
+                    </p:cTn>
+                  </p:par>
+                  <p:par>
+                    <p:cTn id="11" fill="hold">
+                      <p:stCondLst>
+                        <p:cond delay="indefinite"/>
+                      </p:stCondLst>
+                      <p:childTnLst>
+                        <p:par>
+                          <p:cTn id="12" fill="hold">
+                            <p:stCondLst>
+                              <p:cond delay="0"/>
+                            </p:stCondLst>
+                            <p:childTnLst>
+                              <p:par>
+                                <p:cTn id="13" presetID="1" presetClass="entr" presetSubtype="0" fill="hold" nodeType="clickEffect">
+                                  <p:stCondLst>
+                                    <p:cond delay="0"/>
+                                  </p:stCondLst>
+                                  <p:childTnLst>
+                                    <p:set>
+                                      <p:cBhvr>
+                                        <p:cTn id="14" dur="1" fill="hold">
+                                          <p:stCondLst>
+                                            <p:cond delay="0"/>
+                                          </p:stCondLst>
+                                        </p:cTn>
+                                        <p:tgtEl>
+                                          <p:spTgt spid="3">
+                                            <p:txEl>
+                                              <p:pRg st="8" end="8"/>
+                                            </p:txEl>
+                                          </p:spTgt>
+                                        </p:tgtEl>
+                                        <p:attrNameLst>
+                                          <p:attrName>style.visibility</p:attrName>
+                                        </p:attrNameLst>
+                                      </p:cBhvr>
+                                      <p:to>
+                                        <p:strVal val="visible"/>
+                                      </p:to>
+                                    </p:set>
+                                  </p:childTnLst>
+                                </p:cTn>
+                              </p:par>
+                            </p:childTnLst>
+                          </p:cTn>
+                        </p:par>
+                      </p:childTnLst>
+                    </p:cTn>
+                  </p:par>
+                </p:childTnLst>
+              </p:cTn>
+              <p:prevCondLst>
+                <p:cond evt="onPrev" delay="0">
+                  <p:tgtEl>
+                    <p:sldTgt/>
+                  </p:tgtEl>
+                </p:cond>
+              </p:prevCondLst>
+              <p:nextCondLst>
+                <p:cond evt="onNext" delay="0">
+                  <p:tgtEl>
+                    <p:sldTgt/>
+                  </p:tgtEl>
+                </p:cond>
+              </p:nextCondLst>
+            </p:seq>
+          </p:childTnLst>
+        </p:cTn>
+      </p:par>
+    </p:tnLst>
+  </p:timing>
+</p:sld>
+</file>
+
+<file path=ppt/slides/slide12.xml><?xml version="1.0" encoding="utf-8"?>
+<p:sld xmlns:a="http://schemas.openxmlformats.org/drawingml/2006/main" xmlns:r="http://schemas.openxmlformats.org/officeDocument/2006/relationships" xmlns:p="http://schemas.openxmlformats.org/presentationml/2006/main">
+  <p:cSld>
+    <p:spTree>
+      <p:nvGrpSpPr>
+        <p:cNvPr id="1" name=""/>
+        <p:cNvGrpSpPr/>
+        <p:nvPr/>
+      </p:nvGrpSpPr>
+      <p:grpSpPr>
+        <a:xfrm>
+          <a:off x="0" y="0"/>
+          <a:ext cx="0" cy="0"/>
+          <a:chOff x="0" y="0"/>
+          <a:chExt cx="0" cy="0"/>
+        </a:xfrm>
+      </p:grpSpPr>
+      <p:sp>
+        <p:nvSpPr>
+          <p:cNvPr id="2" name="Title 1">
+            <a:extLst>
+              <a:ext uri="{FF2B5EF4-FFF2-40B4-BE49-F238E27FC236}">
+                <a16:creationId xmlns:a16="http://schemas.microsoft.com/office/drawing/2014/main" id="{487008A4-B3BE-6337-2C22-49AE4408EB28}"/>
+              </a:ext>
+            </a:extLst>
+          </p:cNvPr>
+          <p:cNvSpPr>
+            <a:spLocks noGrp="1"/>
+          </p:cNvSpPr>
+          <p:nvPr>
+            <p:ph type="title"/>
+          </p:nvPr>
+        </p:nvSpPr>
+        <p:spPr/>
+        <p:txBody>
+          <a:bodyPr/>
+          <a:lstStyle/>
+          <a:p>
+            <a:r>
+              <a:rPr lang="en-US" dirty="0"/>
+              <a:t>Exercise Time! (50 minutes)</a:t>
+            </a:r>
+          </a:p>
+        </p:txBody>
+      </p:sp>
+      <p:sp>
+        <p:nvSpPr>
+          <p:cNvPr id="3" name="Content Placeholder 2">
+            <a:extLst>
+              <a:ext uri="{FF2B5EF4-FFF2-40B4-BE49-F238E27FC236}">
+                <a16:creationId xmlns:a16="http://schemas.microsoft.com/office/drawing/2014/main" id="{74CF2615-E0BB-1F40-7EF2-6F2B05D99222}"/>
+              </a:ext>
+            </a:extLst>
+          </p:cNvPr>
+          <p:cNvSpPr>
+            <a:spLocks noGrp="1"/>
+          </p:cNvSpPr>
+          <p:nvPr>
+            <p:ph idx="1"/>
+          </p:nvPr>
+        </p:nvSpPr>
+        <p:spPr>
+          <a:xfrm>
+            <a:off x="838200" y="1825625"/>
+            <a:ext cx="5620789" cy="4351338"/>
+          </a:xfrm>
+        </p:spPr>
+        <p:txBody>
+          <a:bodyPr>
+            <a:normAutofit lnSpcReduction="10000"/>
+          </a:bodyPr>
+          <a:lstStyle/>
+          <a:p>
+            <a:r>
+              <a:rPr lang="en-US" dirty="0"/>
+              <a:t>Form a group of group of 5</a:t>
+            </a:r>
+          </a:p>
+          <a:p>
+            <a:r>
+              <a:rPr lang="en-US" dirty="0"/>
+              <a:t>Find an issue across on of the </a:t>
+            </a:r>
+            <a:r>
+              <a:rPr lang="en-US" dirty="0" err="1"/>
+              <a:t>pharmaverse</a:t>
+            </a:r>
+            <a:r>
+              <a:rPr lang="en-US" dirty="0"/>
+              <a:t> packages</a:t>
+            </a:r>
+          </a:p>
+          <a:p>
+            <a:pPr lvl="1"/>
+            <a:r>
+              <a:rPr lang="en-US" dirty="0"/>
+              <a:t>Hint: look for “good first issue”</a:t>
+            </a:r>
+          </a:p>
+          <a:p>
+            <a:pPr lvl="1"/>
+            <a:r>
+              <a:rPr lang="en-US" dirty="0"/>
+              <a:t>Hint: Aim for documentation based issues</a:t>
+            </a:r>
+          </a:p>
+          <a:p>
+            <a:pPr lvl="1"/>
+            <a:r>
+              <a:rPr lang="en-US" dirty="0"/>
+              <a:t>Once you find one, flag down an instructor</a:t>
+            </a:r>
+          </a:p>
+          <a:p>
+            <a:r>
+              <a:rPr lang="en-US" dirty="0"/>
+              <a:t>Lets work on fixing that bug!</a:t>
+            </a:r>
+          </a:p>
+          <a:p>
+            <a:pPr lvl="1"/>
+            <a:r>
+              <a:rPr lang="en-US" dirty="0"/>
+              <a:t>One of the workshop leaders will walk around and help you.</a:t>
+            </a:r>
+          </a:p>
+        </p:txBody>
+      </p:sp>
+      <p:sp>
+        <p:nvSpPr>
+          <p:cNvPr id="5" name="TextBox 4">
+            <a:extLst>
+              <a:ext uri="{FF2B5EF4-FFF2-40B4-BE49-F238E27FC236}">
+                <a16:creationId xmlns:a16="http://schemas.microsoft.com/office/drawing/2014/main" id="{7A861C6E-61DB-2D31-B992-222AED6C0B3E}"/>
+              </a:ext>
+            </a:extLst>
+          </p:cNvPr>
+          <p:cNvSpPr txBox="1"/>
+          <p:nvPr/>
+        </p:nvSpPr>
+        <p:spPr>
+          <a:xfrm>
+            <a:off x="6774874" y="2638338"/>
+            <a:ext cx="5145578" cy="1938992"/>
+          </a:xfrm>
+          <a:prstGeom prst="rect">
+            <a:avLst/>
+          </a:prstGeom>
+          <a:noFill/>
+        </p:spPr>
+        <p:txBody>
+          <a:bodyPr wrap="square">
+            <a:spAutoFit/>
+          </a:bodyPr>
+          <a:lstStyle/>
+          <a:p>
+            <a:r>
+              <a:rPr lang="en-US" sz="2400" dirty="0"/>
+              <a:t>Packages we worked on today:</a:t>
+            </a:r>
+            <a:endParaRPr lang="en-US" sz="2400" dirty="0">
+              <a:hlinkClick r:id="rId2"/>
+            </a:endParaRPr>
+          </a:p>
+          <a:p>
+            <a:endParaRPr lang="en-US" sz="2400" dirty="0">
+              <a:hlinkClick r:id="rId2"/>
+            </a:endParaRPr>
+          </a:p>
+          <a:p>
+            <a:pPr marL="285750" indent="-285750">
+              <a:buFont typeface="Arial" panose="020B0604020202020204" pitchFamily="34" charset="0"/>
+              <a:buChar char="•"/>
+            </a:pPr>
+            <a:r>
+              <a:rPr lang="en-US" dirty="0">
+                <a:hlinkClick r:id="rId2"/>
+              </a:rPr>
+              <a:t>https://github.com/pharmaverse/admiral</a:t>
+            </a:r>
+            <a:endParaRPr lang="en-US" dirty="0"/>
+          </a:p>
+          <a:p>
+            <a:pPr marL="285750" indent="-285750">
+              <a:buFont typeface="Arial" panose="020B0604020202020204" pitchFamily="34" charset="0"/>
+              <a:buChar char="•"/>
+            </a:pPr>
+            <a:r>
+              <a:rPr lang="en-US" dirty="0">
+                <a:hlinkClick r:id="rId3"/>
+              </a:rPr>
+              <a:t>https://github.com/insightsengineering/teal</a:t>
+            </a:r>
+            <a:endParaRPr lang="en-US" dirty="0"/>
+          </a:p>
+          <a:p>
+            <a:pPr marL="285750" indent="-285750">
+              <a:buFont typeface="Arial" panose="020B0604020202020204" pitchFamily="34" charset="0"/>
+              <a:buChar char="•"/>
+            </a:pPr>
+            <a:r>
+              <a:rPr lang="en-US" dirty="0">
+                <a:hlinkClick r:id="rId4"/>
+              </a:rPr>
+              <a:t>https://github.com/GSK-Biostatistics/tfrmt</a:t>
+            </a:r>
+            <a:endParaRPr lang="en-US" dirty="0"/>
+          </a:p>
+          <a:p>
+            <a:pPr marL="285750" indent="-285750">
+              <a:buFont typeface="Arial" panose="020B0604020202020204" pitchFamily="34" charset="0"/>
+              <a:buChar char="•"/>
+            </a:pPr>
+            <a:r>
+              <a:rPr lang="en-US" dirty="0">
+                <a:hlinkClick r:id="rId5"/>
+              </a:rPr>
+              <a:t>https://github.com/GSK-Biostatistics/tfrmtbuilder</a:t>
+            </a:r>
+            <a:endParaRPr lang="en-US" dirty="0"/>
+          </a:p>
+        </p:txBody>
+      </p:sp>
+    </p:spTree>
+    <p:extLst>
+      <p:ext uri="{BB962C8B-B14F-4D97-AF65-F5344CB8AC3E}">
+        <p14:creationId xmlns:p14="http://schemas.microsoft.com/office/powerpoint/2010/main" val="1033892165"/>
+      </p:ext>
+    </p:extLst>
+  </p:cSld>
+  <p:clrMapOvr>
+    <a:masterClrMapping/>
+  </p:clrMapOvr>
+</p:sld>
+</file>
+
+<file path=ppt/slides/slide13.xml><?xml version="1.0" encoding="utf-8"?>
+<p:sld xmlns:a="http://schemas.openxmlformats.org/drawingml/2006/main" xmlns:r="http://schemas.openxmlformats.org/officeDocument/2006/relationships" xmlns:p="http://schemas.openxmlformats.org/presentationml/2006/main">
+  <p:cSld>
+    <p:spTree>
+      <p:nvGrpSpPr>
+        <p:cNvPr id="1" name=""/>
+        <p:cNvGrpSpPr/>
+        <p:nvPr/>
+      </p:nvGrpSpPr>
+      <p:grpSpPr>
+        <a:xfrm>
+          <a:off x="0" y="0"/>
+          <a:ext cx="0" cy="0"/>
+          <a:chOff x="0" y="0"/>
+          <a:chExt cx="0" cy="0"/>
+        </a:xfrm>
+      </p:grpSpPr>
+      <p:sp>
+        <p:nvSpPr>
+          <p:cNvPr id="2" name="Title 1">
+            <a:extLst>
+              <a:ext uri="{FF2B5EF4-FFF2-40B4-BE49-F238E27FC236}">
+                <a16:creationId xmlns:a16="http://schemas.microsoft.com/office/drawing/2014/main" id="{20F2E90E-225D-206C-8CD1-368E2A8A55E6}"/>
+              </a:ext>
+            </a:extLst>
+          </p:cNvPr>
+          <p:cNvSpPr>
+            <a:spLocks noGrp="1"/>
+          </p:cNvSpPr>
+          <p:nvPr>
+            <p:ph type="title"/>
+          </p:nvPr>
+        </p:nvSpPr>
+        <p:spPr/>
+        <p:txBody>
+          <a:bodyPr/>
+          <a:lstStyle/>
+          <a:p>
+            <a:r>
+              <a:rPr lang="en-US" dirty="0"/>
+              <a:t>Close out</a:t>
+            </a:r>
+          </a:p>
+        </p:txBody>
+      </p:sp>
+      <p:sp>
+        <p:nvSpPr>
+          <p:cNvPr id="3" name="Content Placeholder 2">
+            <a:extLst>
+              <a:ext uri="{FF2B5EF4-FFF2-40B4-BE49-F238E27FC236}">
+                <a16:creationId xmlns:a16="http://schemas.microsoft.com/office/drawing/2014/main" id="{2607D7DB-33F2-7EEC-664F-421A1C05E3D9}"/>
+              </a:ext>
+            </a:extLst>
+          </p:cNvPr>
+          <p:cNvSpPr>
+            <a:spLocks noGrp="1"/>
+          </p:cNvSpPr>
+          <p:nvPr>
+            <p:ph idx="1"/>
+          </p:nvPr>
+        </p:nvSpPr>
+        <p:spPr/>
+        <p:txBody>
+          <a:bodyPr/>
+          <a:lstStyle/>
+          <a:p>
+            <a:r>
+              <a:rPr lang="en-US" dirty="0"/>
+              <a:t>Welcome to the </a:t>
+            </a:r>
+            <a:r>
+              <a:rPr lang="en-US" dirty="0" err="1"/>
+              <a:t>Pharmaverse</a:t>
+            </a:r>
+            <a:r>
+              <a:rPr lang="en-US" dirty="0"/>
+              <a:t>!</a:t>
+            </a:r>
+          </a:p>
+          <a:p>
+            <a:r>
+              <a:rPr lang="en-US" dirty="0"/>
+              <a:t>We hope you enjoyed your stay and want to come back to visit, maybe stay for a while</a:t>
+            </a:r>
+          </a:p>
+          <a:p>
+            <a:endParaRPr lang="en-US" dirty="0"/>
+          </a:p>
+        </p:txBody>
+      </p:sp>
+    </p:spTree>
+    <p:extLst>
+      <p:ext uri="{BB962C8B-B14F-4D97-AF65-F5344CB8AC3E}">
+        <p14:creationId xmlns:p14="http://schemas.microsoft.com/office/powerpoint/2010/main" val="2193134711"/>
+      </p:ext>
+    </p:extLst>
+  </p:cSld>
+  <p:clrMapOvr>
+    <a:masterClrMapping/>
+  </p:clrMapOvr>
+</p:sld>
+</file>
+
+<file path=ppt/slides/slide14.xml><?xml version="1.0" encoding="utf-8"?>
+<p:sld xmlns:a="http://schemas.openxmlformats.org/drawingml/2006/main" xmlns:r="http://schemas.openxmlformats.org/officeDocument/2006/relationships" xmlns:p="http://schemas.openxmlformats.org/presentationml/2006/main">
+  <p:cSld>
+    <p:spTree>
+      <p:nvGrpSpPr>
+        <p:cNvPr id="1" name=""/>
+        <p:cNvGrpSpPr/>
+        <p:nvPr/>
+      </p:nvGrpSpPr>
+      <p:grpSpPr>
+        <a:xfrm>
+          <a:off x="0" y="0"/>
+          <a:ext cx="0" cy="0"/>
+          <a:chOff x="0" y="0"/>
+          <a:chExt cx="0" cy="0"/>
+        </a:xfrm>
+      </p:grpSpPr>
+      <p:sp>
+        <p:nvSpPr>
+          <p:cNvPr id="2" name="Title 1">
+            <a:extLst>
+              <a:ext uri="{FF2B5EF4-FFF2-40B4-BE49-F238E27FC236}">
+                <a16:creationId xmlns:a16="http://schemas.microsoft.com/office/drawing/2014/main" id="{311D0BD9-FB7A-6380-8831-C3F0CFB43A02}"/>
+              </a:ext>
+            </a:extLst>
+          </p:cNvPr>
+          <p:cNvSpPr>
+            <a:spLocks noGrp="1"/>
+          </p:cNvSpPr>
+          <p:nvPr>
+            <p:ph type="title"/>
+          </p:nvPr>
+        </p:nvSpPr>
+        <p:spPr/>
+        <p:txBody>
+          <a:bodyPr/>
+          <a:lstStyle/>
+          <a:p>
+            <a:r>
+              <a:rPr lang="en-US" dirty="0"/>
+              <a:t>Post-Workshop Survey</a:t>
+            </a:r>
+          </a:p>
+        </p:txBody>
+      </p:sp>
+      <p:sp>
+        <p:nvSpPr>
+          <p:cNvPr id="3" name="Content Placeholder 2">
+            <a:extLst>
+              <a:ext uri="{FF2B5EF4-FFF2-40B4-BE49-F238E27FC236}">
+                <a16:creationId xmlns:a16="http://schemas.microsoft.com/office/drawing/2014/main" id="{51C6C13D-D8B4-5140-7B35-8F18B35B00E7}"/>
+              </a:ext>
+            </a:extLst>
+          </p:cNvPr>
+          <p:cNvSpPr>
+            <a:spLocks noGrp="1"/>
+          </p:cNvSpPr>
+          <p:nvPr>
+            <p:ph idx="1"/>
+          </p:nvPr>
+        </p:nvSpPr>
+        <p:spPr/>
+        <p:txBody>
+          <a:bodyPr>
+            <a:normAutofit/>
+          </a:bodyPr>
+          <a:lstStyle/>
+          <a:p>
+            <a:r>
+              <a:rPr lang="en-US" dirty="0">
+                <a:effectLst/>
+                <a:latin typeface="Calibri" panose="020F0502020204030204" pitchFamily="34" charset="0"/>
+                <a:ea typeface="Times New Roman" panose="02020603050405020304" pitchFamily="18" charset="0"/>
+              </a:rPr>
+              <a:t>Your feedback is crucial! </a:t>
+            </a:r>
+          </a:p>
+          <a:p>
+            <a:r>
+              <a:rPr lang="en-US" dirty="0">
+                <a:effectLst/>
+                <a:latin typeface="Calibri" panose="020F0502020204030204" pitchFamily="34" charset="0"/>
+                <a:ea typeface="Times New Roman" panose="02020603050405020304" pitchFamily="18" charset="0"/>
+              </a:rPr>
+              <a:t>Data from the survey informs curriculum and format decisions for future conf workshops, and we really appreciate you taking the time to provide it</a:t>
+            </a:r>
+            <a:endParaRPr lang="en-US" sz="4000" dirty="0"/>
+          </a:p>
+        </p:txBody>
+      </p:sp>
+      <p:sp>
+        <p:nvSpPr>
+          <p:cNvPr id="7" name="TextBox 6">
+            <a:extLst>
+              <a:ext uri="{FF2B5EF4-FFF2-40B4-BE49-F238E27FC236}">
+                <a16:creationId xmlns:a16="http://schemas.microsoft.com/office/drawing/2014/main" id="{142F6A5E-9C15-236E-A835-A4901738428E}"/>
+              </a:ext>
+            </a:extLst>
+          </p:cNvPr>
+          <p:cNvSpPr txBox="1"/>
+          <p:nvPr/>
+        </p:nvSpPr>
+        <p:spPr>
+          <a:xfrm>
+            <a:off x="2275263" y="3876102"/>
+            <a:ext cx="7641473" cy="830997"/>
+          </a:xfrm>
+          <a:prstGeom prst="rect">
+            <a:avLst/>
+          </a:prstGeom>
+          <a:noFill/>
+        </p:spPr>
+        <p:txBody>
+          <a:bodyPr wrap="square">
+            <a:spAutoFit/>
+          </a:bodyPr>
+          <a:lstStyle/>
+          <a:p>
+            <a:pPr algn="ctr"/>
+            <a:r>
+              <a:rPr lang="en-US" sz="4800" dirty="0">
+                <a:effectLst/>
+                <a:latin typeface="Calibri" panose="020F0502020204030204" pitchFamily="34" charset="0"/>
+                <a:ea typeface="Times New Roman" panose="02020603050405020304" pitchFamily="18" charset="0"/>
+              </a:rPr>
+              <a:t>pos.it/conf-workshop-survey</a:t>
+            </a:r>
+            <a:endParaRPr lang="en-US" sz="4800" dirty="0"/>
+          </a:p>
+        </p:txBody>
+      </p:sp>
+    </p:spTree>
+    <p:extLst>
+      <p:ext uri="{BB962C8B-B14F-4D97-AF65-F5344CB8AC3E}">
+        <p14:creationId xmlns:p14="http://schemas.microsoft.com/office/powerpoint/2010/main" val="1474830922"/>
+      </p:ext>
+    </p:extLst>
+  </p:cSld>
+  <p:clrMapOvr>
+    <a:masterClrMapping/>
+  </p:clrMapOvr>
+</p:sld>
+</file>
+
 <file path=ppt/slides/slide2.xml><?xml version="1.0" encoding="utf-8"?>
 <p:sld xmlns:a="http://schemas.openxmlformats.org/drawingml/2006/main" xmlns:r="http://schemas.openxmlformats.org/officeDocument/2006/relationships" xmlns:p="http://schemas.openxmlformats.org/presentationml/2006/main">
   <p:cSld>
@@ -3576,7 +4598,16 @@
           <a:bodyPr/>
           <a:lstStyle/>
           <a:p>
-            <a:endParaRPr lang="en-US"/>
+            <a:r>
+              <a:rPr lang="en-US" dirty="0"/>
+              <a:t>Pharmaverse.org</a:t>
+            </a:r>
+          </a:p>
+          <a:p>
+            <a:endParaRPr lang="en-US" dirty="0"/>
+          </a:p>
+          <a:p>
+            <a:endParaRPr lang="en-US" dirty="0"/>
           </a:p>
         </p:txBody>
       </p:sp>
@@ -3760,8 +4791,13 @@
           <a:p>
             <a:r>
               <a:rPr lang="en-US" dirty="0"/>
-              <a:t>Thomas – your PHUSE 2023 talk content would be great here</a:t>
-            </a:r>
+              <a:t>Thomas – your PHUSE 2023 talk content would be great here </a:t>
+            </a:r>
+            <a:r>
+              <a:rPr lang="en-US"/>
+              <a:t>(Slides 3-5)</a:t>
+            </a:r>
+            <a:endParaRPr lang="en-US" dirty="0"/>
           </a:p>
         </p:txBody>
       </p:sp>
@@ -3817,8 +4853,12 @@
           <a:lstStyle/>
           <a:p>
             <a:r>
+              <a:rPr lang="en-US" dirty="0"/>
+              <a:t>C</a:t>
+            </a:r>
+            <a:r>
               <a:rPr lang="en-CH" dirty="0"/>
-              <a:t>Different contribution levels</a:t>
+              <a:t>ontribution levels</a:t>
             </a:r>
           </a:p>
         </p:txBody>
@@ -3842,49 +4882,13 @@
         <p:spPr/>
         <p:txBody>
           <a:bodyPr>
-            <a:normAutofit lnSpcReduction="10000"/>
+            <a:normAutofit/>
           </a:bodyPr>
           <a:lstStyle/>
           <a:p>
             <a:r>
-              <a:rPr lang="en-CH" dirty="0"/>
-              <a:t>Submit the issue (bug / docs / feature request)</a:t>
-            </a:r>
-          </a:p>
-          <a:p>
-            <a:r>
-              <a:rPr lang="en-CH" dirty="0"/>
-              <a:t>Submit the issue and (co)develop the PR</a:t>
-            </a:r>
-          </a:p>
-          <a:p>
-            <a:r>
-              <a:rPr lang="en-CH" dirty="0"/>
-              <a:t>Give us the feedback</a:t>
-            </a:r>
-          </a:p>
-          <a:p>
-            <a:r>
-              <a:rPr lang="en-CH" dirty="0"/>
-              <a:t>Wanted to join as a long term contributor – get in touch with the maintainer</a:t>
-            </a:r>
-          </a:p>
-          <a:p>
-            <a:endParaRPr lang="en-CH" dirty="0"/>
-          </a:p>
-          <a:p>
-            <a:endParaRPr lang="en-CH" dirty="0"/>
-          </a:p>
-          <a:p>
-            <a:endParaRPr lang="en-CH" dirty="0"/>
-          </a:p>
-          <a:p>
-            <a:pPr marL="0" indent="0">
-              <a:buNone/>
-            </a:pPr>
-            <a:r>
-              <a:rPr lang="en-CH" dirty="0"/>
-              <a:t>All types of contributions are welcome!</a:t>
+              <a:rPr lang="en-US" dirty="0"/>
+              <a:t>Use the packages</a:t>
             </a:r>
           </a:p>
           <a:p>
@@ -3895,7 +4899,7 @@
     </p:spTree>
     <p:extLst>
       <p:ext uri="{BB962C8B-B14F-4D97-AF65-F5344CB8AC3E}">
-        <p14:creationId xmlns:p14="http://schemas.microsoft.com/office/powerpoint/2010/main" val="3342367078"/>
+        <p14:creationId xmlns:p14="http://schemas.microsoft.com/office/powerpoint/2010/main" val="2157211617"/>
       </p:ext>
     </p:extLst>
   </p:cSld>
@@ -3927,7 +4931,7 @@
           <p:cNvPr id="2" name="Title 1">
             <a:extLst>
               <a:ext uri="{FF2B5EF4-FFF2-40B4-BE49-F238E27FC236}">
-                <a16:creationId xmlns:a16="http://schemas.microsoft.com/office/drawing/2014/main" id="{E6E92473-15E9-3F94-627D-3E4A63E7A5F0}"/>
+                <a16:creationId xmlns:a16="http://schemas.microsoft.com/office/drawing/2014/main" id="{575F4081-31BC-774C-C1EB-75A050907BFF}"/>
               </a:ext>
             </a:extLst>
           </p:cNvPr>
@@ -3945,7 +4949,11 @@
           <a:p>
             <a:r>
               <a:rPr lang="en-US" dirty="0"/>
-              <a:t>How to contribute?</a:t>
+              <a:t>C</a:t>
+            </a:r>
+            <a:r>
+              <a:rPr lang="en-CH" dirty="0"/>
+              <a:t>ontribution levels</a:t>
             </a:r>
           </a:p>
         </p:txBody>
@@ -3955,7 +4963,7 @@
           <p:cNvPr id="3" name="Content Placeholder 2">
             <a:extLst>
               <a:ext uri="{FF2B5EF4-FFF2-40B4-BE49-F238E27FC236}">
-                <a16:creationId xmlns:a16="http://schemas.microsoft.com/office/drawing/2014/main" id="{8CD8979D-6E0A-FFBE-FB0E-DDF3EBA095A9}"/>
+                <a16:creationId xmlns:a16="http://schemas.microsoft.com/office/drawing/2014/main" id="{88B5BC8D-FD02-5098-F6E0-E650FCC6A74A}"/>
               </a:ext>
             </a:extLst>
           </p:cNvPr>
@@ -3968,50 +4976,256 @@
         </p:nvSpPr>
         <p:spPr/>
         <p:txBody>
-          <a:bodyPr/>
-          <a:lstStyle/>
-          <a:p>
-            <a:r>
-              <a:rPr lang="en-US" dirty="0"/>
-              <a:t>Use it</a:t>
-            </a:r>
-          </a:p>
-          <a:p>
-            <a:r>
-              <a:rPr lang="en-US" dirty="0"/>
-              <a:t>Open issues when bugs are found</a:t>
-            </a:r>
-          </a:p>
-          <a:p>
-            <a:r>
-              <a:rPr lang="en-US" dirty="0"/>
-              <a:t>Provide feedback on ways to improve</a:t>
-            </a:r>
-          </a:p>
-          <a:p>
-            <a:r>
-              <a:rPr lang="en-US" dirty="0"/>
-              <a:t>Serve as part of the teams developing</a:t>
-            </a:r>
-          </a:p>
-          <a:p>
-            <a:r>
-              <a:rPr lang="en-US" dirty="0"/>
-              <a:t>Contribute code</a:t>
-            </a:r>
+          <a:bodyPr>
+            <a:normAutofit/>
+          </a:bodyPr>
+          <a:lstStyle/>
+          <a:p>
+            <a:r>
+              <a:rPr lang="en-US" dirty="0"/>
+              <a:t>Use the packages</a:t>
+            </a:r>
+          </a:p>
+          <a:p>
+            <a:r>
+              <a:rPr lang="en-CH" dirty="0"/>
+              <a:t>Submit </a:t>
+            </a:r>
+            <a:r>
+              <a:rPr lang="en-US" dirty="0"/>
+              <a:t>I</a:t>
+            </a:r>
+            <a:r>
+              <a:rPr lang="en-CH" dirty="0"/>
+              <a:t>ssue</a:t>
+            </a:r>
+            <a:r>
+              <a:rPr lang="en-US" dirty="0"/>
+              <a:t>s</a:t>
+            </a:r>
+            <a:r>
+              <a:rPr lang="en-CH" dirty="0"/>
+              <a:t> </a:t>
+            </a:r>
+            <a:endParaRPr lang="en-US" dirty="0"/>
+          </a:p>
+          <a:p>
+            <a:pPr lvl="1"/>
+            <a:r>
+              <a:rPr lang="en-US" dirty="0"/>
+              <a:t>documentation</a:t>
+            </a:r>
+          </a:p>
+          <a:p>
+            <a:pPr lvl="1"/>
+            <a:r>
+              <a:rPr lang="en-CH" dirty="0"/>
+              <a:t>feature request</a:t>
+            </a:r>
+            <a:r>
+              <a:rPr lang="en-US" dirty="0"/>
+              <a:t>s</a:t>
+            </a:r>
+          </a:p>
+          <a:p>
+            <a:pPr lvl="1"/>
+            <a:r>
+              <a:rPr lang="en-CH" dirty="0"/>
+              <a:t>bug</a:t>
+            </a:r>
+          </a:p>
+          <a:p>
+            <a:endParaRPr lang="en-CH" dirty="0"/>
           </a:p>
         </p:txBody>
       </p:sp>
     </p:spTree>
     <p:extLst>
       <p:ext uri="{BB962C8B-B14F-4D97-AF65-F5344CB8AC3E}">
-        <p14:creationId xmlns:p14="http://schemas.microsoft.com/office/powerpoint/2010/main" val="2635565262"/>
+        <p14:creationId xmlns:p14="http://schemas.microsoft.com/office/powerpoint/2010/main" val="82912287"/>
       </p:ext>
     </p:extLst>
   </p:cSld>
   <p:clrMapOvr>
     <a:masterClrMapping/>
   </p:clrMapOvr>
+  <p:timing>
+    <p:tnLst>
+      <p:par>
+        <p:cTn id="1" dur="indefinite" restart="never" nodeType="tmRoot">
+          <p:childTnLst>
+            <p:seq concurrent="1" nextAc="seek">
+              <p:cTn id="2" dur="indefinite" nodeType="mainSeq">
+                <p:childTnLst>
+                  <p:par>
+                    <p:cTn id="3" fill="hold">
+                      <p:stCondLst>
+                        <p:cond delay="indefinite"/>
+                      </p:stCondLst>
+                      <p:childTnLst>
+                        <p:par>
+                          <p:cTn id="4" fill="hold">
+                            <p:stCondLst>
+                              <p:cond delay="0"/>
+                            </p:stCondLst>
+                            <p:childTnLst>
+                              <p:par>
+                                <p:cTn id="5" presetID="1" presetClass="entr" presetSubtype="0" fill="hold" nodeType="clickEffect">
+                                  <p:stCondLst>
+                                    <p:cond delay="0"/>
+                                  </p:stCondLst>
+                                  <p:childTnLst>
+                                    <p:set>
+                                      <p:cBhvr>
+                                        <p:cTn id="6" dur="1" fill="hold">
+                                          <p:stCondLst>
+                                            <p:cond delay="0"/>
+                                          </p:stCondLst>
+                                        </p:cTn>
+                                        <p:tgtEl>
+                                          <p:spTgt spid="3">
+                                            <p:txEl>
+                                              <p:pRg st="2" end="2"/>
+                                            </p:txEl>
+                                          </p:spTgt>
+                                        </p:tgtEl>
+                                        <p:attrNameLst>
+                                          <p:attrName>style.visibility</p:attrName>
+                                        </p:attrNameLst>
+                                      </p:cBhvr>
+                                      <p:to>
+                                        <p:strVal val="visible"/>
+                                      </p:to>
+                                    </p:set>
+                                  </p:childTnLst>
+                                </p:cTn>
+                              </p:par>
+                            </p:childTnLst>
+                          </p:cTn>
+                        </p:par>
+                      </p:childTnLst>
+                    </p:cTn>
+                  </p:par>
+                  <p:par>
+                    <p:cTn id="7" fill="hold">
+                      <p:stCondLst>
+                        <p:cond delay="indefinite"/>
+                      </p:stCondLst>
+                      <p:childTnLst>
+                        <p:par>
+                          <p:cTn id="8" fill="hold">
+                            <p:stCondLst>
+                              <p:cond delay="0"/>
+                            </p:stCondLst>
+                            <p:childTnLst>
+                              <p:par>
+                                <p:cTn id="9" presetID="1" presetClass="entr" presetSubtype="0" fill="hold" nodeType="clickEffect">
+                                  <p:stCondLst>
+                                    <p:cond delay="0"/>
+                                  </p:stCondLst>
+                                  <p:childTnLst>
+                                    <p:set>
+                                      <p:cBhvr>
+                                        <p:cTn id="10" dur="1" fill="hold">
+                                          <p:stCondLst>
+                                            <p:cond delay="0"/>
+                                          </p:stCondLst>
+                                        </p:cTn>
+                                        <p:tgtEl>
+                                          <p:spTgt spid="3">
+                                            <p:txEl>
+                                              <p:pRg st="3" end="3"/>
+                                            </p:txEl>
+                                          </p:spTgt>
+                                        </p:tgtEl>
+                                        <p:attrNameLst>
+                                          <p:attrName>style.visibility</p:attrName>
+                                        </p:attrNameLst>
+                                      </p:cBhvr>
+                                      <p:to>
+                                        <p:strVal val="visible"/>
+                                      </p:to>
+                                    </p:set>
+                                  </p:childTnLst>
+                                </p:cTn>
+                              </p:par>
+                            </p:childTnLst>
+                          </p:cTn>
+                        </p:par>
+                      </p:childTnLst>
+                    </p:cTn>
+                  </p:par>
+                  <p:par>
+                    <p:cTn id="11" fill="hold">
+                      <p:stCondLst>
+                        <p:cond delay="indefinite"/>
+                      </p:stCondLst>
+                      <p:childTnLst>
+                        <p:par>
+                          <p:cTn id="12" fill="hold">
+                            <p:stCondLst>
+                              <p:cond delay="0"/>
+                            </p:stCondLst>
+                            <p:childTnLst>
+                              <p:par>
+                                <p:cTn id="13" presetID="1" presetClass="entr" presetSubtype="0" fill="hold" nodeType="clickEffect">
+                                  <p:stCondLst>
+                                    <p:cond delay="0"/>
+                                  </p:stCondLst>
+                                  <p:childTnLst>
+                                    <p:set>
+                                      <p:cBhvr>
+                                        <p:cTn id="14" dur="1" fill="hold">
+                                          <p:stCondLst>
+                                            <p:cond delay="0"/>
+                                          </p:stCondLst>
+                                        </p:cTn>
+                                        <p:tgtEl>
+                                          <p:spTgt spid="3">
+                                            <p:txEl>
+                                              <p:pRg st="4" end="4"/>
+                                            </p:txEl>
+                                          </p:spTgt>
+                                        </p:tgtEl>
+                                        <p:attrNameLst>
+                                          <p:attrName>style.visibility</p:attrName>
+                                        </p:attrNameLst>
+                                      </p:cBhvr>
+                                      <p:to>
+                                        <p:strVal val="visible"/>
+                                      </p:to>
+                                    </p:set>
+                                  </p:childTnLst>
+                                </p:cTn>
+                              </p:par>
+                            </p:childTnLst>
+                          </p:cTn>
+                        </p:par>
+                      </p:childTnLst>
+                    </p:cTn>
+                  </p:par>
+                </p:childTnLst>
+              </p:cTn>
+              <p:prevCondLst>
+                <p:cond evt="onPrev" delay="0">
+                  <p:tgtEl>
+                    <p:sldTgt/>
+                  </p:tgtEl>
+                </p:cond>
+              </p:prevCondLst>
+              <p:nextCondLst>
+                <p:cond evt="onNext" delay="0">
+                  <p:tgtEl>
+                    <p:sldTgt/>
+                  </p:tgtEl>
+                </p:cond>
+              </p:nextCondLst>
+            </p:seq>
+          </p:childTnLst>
+        </p:cTn>
+      </p:par>
+    </p:tnLst>
+  </p:timing>
 </p:sld>
 </file>
 
@@ -4053,7 +5267,10 @@
           <a:bodyPr/>
           <a:lstStyle/>
           <a:p>
-            <a:endParaRPr lang="en-US"/>
+            <a:r>
+              <a:rPr lang="en-US" dirty="0"/>
+              <a:t>Opening an Issue</a:t>
+            </a:r>
           </a:p>
         </p:txBody>
       </p:sp>
@@ -4080,13 +5297,46 @@
           <a:p>
             <a:r>
               <a:rPr lang="en-US" dirty="0"/>
-              <a:t>If you saw an bug today, open an issue with an MVP!</a:t>
-            </a:r>
-          </a:p>
-          <a:p>
-            <a:r>
-              <a:rPr lang="en-US" dirty="0"/>
-              <a:t>If you saw a discrepancy or typo in the documentation, open an issue pointing to the documentation and what you think should be fixed</a:t>
+              <a:t>If you saw a discrepancy or typo in the documentation of a package used today, open an issue pointing to the documentation and what you think should be fixed</a:t>
+            </a:r>
+          </a:p>
+          <a:p>
+            <a:pPr lvl="1"/>
+            <a:r>
+              <a:rPr lang="en-US" dirty="0"/>
+              <a:t>Find the </a:t>
+            </a:r>
+            <a:r>
+              <a:rPr lang="en-US" dirty="0" err="1"/>
+              <a:t>github</a:t>
+            </a:r>
+            <a:r>
+              <a:rPr lang="en-US" dirty="0"/>
+              <a:t> page for the package</a:t>
+            </a:r>
+          </a:p>
+          <a:p>
+            <a:pPr lvl="1"/>
+            <a:r>
+              <a:rPr lang="en-US" dirty="0"/>
+              <a:t>Click on “Issues” then “New issue”</a:t>
+            </a:r>
+          </a:p>
+          <a:p>
+            <a:pPr lvl="1"/>
+            <a:r>
+              <a:rPr lang="en-US" dirty="0"/>
+              <a:t>Write the location of the discrepancy and what you think might be a better solution</a:t>
+            </a:r>
+          </a:p>
+          <a:p>
+            <a:pPr lvl="1"/>
+            <a:endParaRPr lang="en-US" dirty="0"/>
+          </a:p>
+          <a:p>
+            <a:r>
+              <a:rPr lang="en-US" dirty="0"/>
+              <a:t>Demo Time on admiral!</a:t>
             </a:r>
           </a:p>
           <a:p>
@@ -4104,6 +5354,85 @@
   <p:clrMapOvr>
     <a:masterClrMapping/>
   </p:clrMapOvr>
+  <p:timing>
+    <p:tnLst>
+      <p:par>
+        <p:cTn id="1" dur="indefinite" restart="never" nodeType="tmRoot">
+          <p:childTnLst>
+            <p:seq concurrent="1" nextAc="seek">
+              <p:cTn id="2" dur="indefinite" nodeType="mainSeq">
+                <p:childTnLst>
+                  <p:par>
+                    <p:cTn id="3" fill="hold">
+                      <p:stCondLst>
+                        <p:cond delay="indefinite"/>
+                      </p:stCondLst>
+                      <p:childTnLst>
+                        <p:par>
+                          <p:cTn id="4" fill="hold">
+                            <p:stCondLst>
+                              <p:cond delay="0"/>
+                            </p:stCondLst>
+                            <p:childTnLst>
+                              <p:par>
+                                <p:cTn id="5" presetID="1" presetClass="entr" presetSubtype="0" fill="hold" nodeType="clickEffect">
+                                  <p:stCondLst>
+                                    <p:cond delay="0"/>
+                                  </p:stCondLst>
+                                  <p:childTnLst>
+                                    <p:set>
+                                      <p:cBhvr>
+                                        <p:cTn id="6" dur="1" fill="hold">
+                                          <p:stCondLst>
+                                            <p:cond delay="0"/>
+                                          </p:stCondLst>
+                                        </p:cTn>
+                                        <p:tgtEl>
+                                          <p:spTgt spid="3">
+                                            <p:txEl>
+                                              <p:pRg st="5" end="5"/>
+                                            </p:txEl>
+                                          </p:spTgt>
+                                        </p:tgtEl>
+                                        <p:attrNameLst>
+                                          <p:attrName>style.visibility</p:attrName>
+                                        </p:attrNameLst>
+                                      </p:cBhvr>
+                                      <p:to>
+                                        <p:strVal val="visible"/>
+                                      </p:to>
+                                    </p:set>
+                                  </p:childTnLst>
+                                </p:cTn>
+                              </p:par>
+                            </p:childTnLst>
+                          </p:cTn>
+                        </p:par>
+                      </p:childTnLst>
+                    </p:cTn>
+                  </p:par>
+                </p:childTnLst>
+              </p:cTn>
+              <p:prevCondLst>
+                <p:cond evt="onPrev" delay="0">
+                  <p:tgtEl>
+                    <p:sldTgt/>
+                  </p:tgtEl>
+                </p:cond>
+              </p:prevCondLst>
+              <p:nextCondLst>
+                <p:cond evt="onNext" delay="0">
+                  <p:tgtEl>
+                    <p:sldTgt/>
+                  </p:tgtEl>
+                </p:cond>
+              </p:nextCondLst>
+            </p:seq>
+          </p:childTnLst>
+        </p:cTn>
+      </p:par>
+    </p:tnLst>
+  </p:timing>
 </p:sld>
 </file>
 
@@ -4129,7 +5458,7 @@
           <p:cNvPr id="2" name="Title 1">
             <a:extLst>
               <a:ext uri="{FF2B5EF4-FFF2-40B4-BE49-F238E27FC236}">
-                <a16:creationId xmlns:a16="http://schemas.microsoft.com/office/drawing/2014/main" id="{487008A4-B3BE-6337-2C22-49AE4408EB28}"/>
+                <a16:creationId xmlns:a16="http://schemas.microsoft.com/office/drawing/2014/main" id="{19213C66-1286-66B5-81E5-991CD41106E6}"/>
               </a:ext>
             </a:extLst>
           </p:cNvPr>
@@ -4145,7 +5474,10 @@
           <a:bodyPr/>
           <a:lstStyle/>
           <a:p>
-            <a:endParaRPr lang="en-US"/>
+            <a:r>
+              <a:rPr lang="en-US" dirty="0"/>
+              <a:t>Opening an Issue (Innovator mode)</a:t>
+            </a:r>
           </a:p>
         </p:txBody>
       </p:sp>
@@ -4154,7 +5486,7 @@
           <p:cNvPr id="3" name="Content Placeholder 2">
             <a:extLst>
               <a:ext uri="{FF2B5EF4-FFF2-40B4-BE49-F238E27FC236}">
-                <a16:creationId xmlns:a16="http://schemas.microsoft.com/office/drawing/2014/main" id="{74CF2615-E0BB-1F40-7EF2-6F2B05D99222}"/>
+                <a16:creationId xmlns:a16="http://schemas.microsoft.com/office/drawing/2014/main" id="{48E16900-D0F4-27A6-5BBB-4673F1514A3B}"/>
               </a:ext>
             </a:extLst>
           </p:cNvPr>
@@ -4172,63 +5504,58 @@
           <a:p>
             <a:r>
               <a:rPr lang="en-US" dirty="0"/>
-              <a:t>Form a group of group of 5</a:t>
-            </a:r>
-          </a:p>
-          <a:p>
-            <a:r>
-              <a:rPr lang="en-US" dirty="0"/>
-              <a:t>Find an issue across on of the </a:t>
+              <a:t>If you have a feature you would like to see in the package!</a:t>
+            </a:r>
+          </a:p>
+          <a:p>
+            <a:pPr lvl="1"/>
+            <a:r>
+              <a:rPr lang="en-US" dirty="0"/>
+              <a:t>Find the </a:t>
             </a:r>
             <a:r>
               <a:rPr lang="en-US" dirty="0" err="1"/>
-              <a:t>pharmaverse</a:t>
-            </a:r>
-            <a:r>
-              <a:rPr lang="en-US" dirty="0"/>
-              <a:t> packages</a:t>
+              <a:t>github</a:t>
+            </a:r>
+            <a:r>
+              <a:rPr lang="en-US" dirty="0"/>
+              <a:t> page for the package</a:t>
             </a:r>
           </a:p>
           <a:p>
             <a:pPr lvl="1"/>
             <a:r>
               <a:rPr lang="en-US" dirty="0"/>
-              <a:t>Hint: look for ones marked “good first issue”</a:t>
+              <a:t>Click on “Issues” then “New issue”</a:t>
             </a:r>
           </a:p>
           <a:p>
             <a:pPr lvl="1"/>
             <a:r>
               <a:rPr lang="en-US" dirty="0"/>
-              <a:t>Hint: Aim for documentation based issues</a:t>
+              <a:t>Write out an explanation of the feature you would like to see and why</a:t>
             </a:r>
           </a:p>
           <a:p>
             <a:pPr lvl="1"/>
             <a:r>
               <a:rPr lang="en-US" dirty="0"/>
-              <a:t>Once you find one, flag down an instructor</a:t>
-            </a:r>
-          </a:p>
-          <a:p>
-            <a:r>
-              <a:rPr lang="en-US" dirty="0"/>
-              <a:t>Lets work on fixing that bug!</a:t>
-            </a:r>
-          </a:p>
-          <a:p>
-            <a:pPr lvl="1"/>
-            <a:r>
-              <a:rPr lang="en-US" dirty="0"/>
-              <a:t>One of the workshop leaders will walk around and help you.</a:t>
-            </a:r>
+              <a:t>(optional) write pseudocode code content, detailing what you would expect and how you would like to interact with it</a:t>
+            </a:r>
+          </a:p>
+          <a:p>
+            <a:pPr lvl="2"/>
+            <a:endParaRPr lang="en-US" dirty="0"/>
+          </a:p>
+          <a:p>
+            <a:endParaRPr lang="en-US" dirty="0"/>
           </a:p>
         </p:txBody>
       </p:sp>
     </p:spTree>
     <p:extLst>
       <p:ext uri="{BB962C8B-B14F-4D97-AF65-F5344CB8AC3E}">
-        <p14:creationId xmlns:p14="http://schemas.microsoft.com/office/powerpoint/2010/main" val="1033892165"/>
+        <p14:creationId xmlns:p14="http://schemas.microsoft.com/office/powerpoint/2010/main" val="2731555695"/>
       </p:ext>
     </p:extLst>
   </p:cSld>

</xml_diff>